<commit_message>
add TR2 Exercise 2 description and reference
</commit_message>
<xml_diff>
--- a/Slides/TS2_-_From_motion_data_to_dynamic_models.pptx
+++ b/Slides/TS2_-_From_motion_data_to_dynamic_models.pptx
@@ -8763,10 +8763,9 @@
           <a:lstStyle/>
           <a:p>
             <a:r>
-              <a:rPr lang="en-GB" sz="6600" dirty="0" smtClean="0"/>
+              <a:rPr lang="en-GB" sz="6600" dirty="0"/>
               <a:t>Modelling for control of autonomous marine vehicles</a:t>
             </a:r>
-            <a:endParaRPr lang="en-GB" sz="6600" dirty="0"/>
           </a:p>
         </p:txBody>
       </p:sp>
@@ -8792,10 +8791,9 @@
           <a:lstStyle/>
           <a:p>
             <a:r>
-              <a:rPr lang="en-GB" dirty="0" smtClean="0"/>
+              <a:rPr lang="en-GB" dirty="0"/>
               <a:t>Autonomous Marine Robotics – Training session 2</a:t>
             </a:r>
-            <a:endParaRPr lang="en-GB" dirty="0"/>
           </a:p>
         </p:txBody>
       </p:sp>
@@ -8910,10 +8908,9 @@
           <a:lstStyle/>
           <a:p>
             <a:r>
-              <a:rPr lang="en-GB" dirty="0" smtClean="0"/>
+              <a:rPr lang="en-GB" dirty="0"/>
               <a:t>Exercise 1 – Vehicle kinematics</a:t>
             </a:r>
-            <a:endParaRPr lang="en-GB" dirty="0"/>
           </a:p>
         </p:txBody>
       </p:sp>
@@ -8943,27 +8940,27 @@
               <a:buAutoNum type="arabicPeriod"/>
             </a:pPr>
             <a:r>
-              <a:rPr lang="en-GB" dirty="0" smtClean="0"/>
+              <a:rPr lang="en-GB" dirty="0"/>
               <a:t>An autonomous marine vehicle is sailing with a constant speed U = 10 knots and a constant heading </a:t>
             </a:r>
             <a:r>
-              <a:rPr lang="el-GR" dirty="0" smtClean="0"/>
+              <a:rPr lang="el-GR" dirty="0"/>
               <a:t>φ</a:t>
             </a:r>
             <a:r>
-              <a:rPr lang="da-DK" dirty="0" smtClean="0"/>
+              <a:rPr lang="da-DK" dirty="0"/>
               <a:t> = -25 </a:t>
             </a:r>
             <a:r>
-              <a:rPr lang="en-US" dirty="0" smtClean="0"/>
+              <a:rPr lang="en-US" dirty="0"/>
               <a:t>degrees</a:t>
             </a:r>
             <a:r>
-              <a:rPr lang="da-DK" dirty="0" smtClean="0"/>
+              <a:rPr lang="da-DK" dirty="0"/>
               <a:t>. </a:t>
             </a:r>
             <a:r>
-              <a:rPr lang="en-US" dirty="0" smtClean="0"/>
+              <a:rPr lang="en-US" dirty="0"/>
               <a:t>Assuming that the motion of the craft is restrained to the horizontal plane and no ocean current is present, compute the following:</a:t>
             </a:r>
           </a:p>
@@ -8973,7 +8970,7 @@
               <a:buAutoNum type="alphaUcPeriod"/>
             </a:pPr>
             <a:r>
-              <a:rPr lang="en-US" dirty="0" smtClean="0"/>
+              <a:rPr lang="en-US" dirty="0"/>
               <a:t>Derive the continuous time kinematic model that describes the motion of the autonomous marine vehicle in the tangential frame</a:t>
             </a:r>
           </a:p>
@@ -8983,15 +8980,15 @@
               <a:buAutoNum type="alphaUcPeriod"/>
             </a:pPr>
             <a:r>
-              <a:rPr lang="en-US" dirty="0" smtClean="0"/>
+              <a:rPr lang="en-US" dirty="0"/>
               <a:t>Implement the obtained model in </a:t>
             </a:r>
             <a:r>
-              <a:rPr lang="en-US" dirty="0" err="1" smtClean="0"/>
+              <a:rPr lang="en-US" dirty="0" err="1"/>
               <a:t>Matlab</a:t>
             </a:r>
             <a:r>
-              <a:rPr lang="en-US" dirty="0" smtClean="0"/>
+              <a:rPr lang="en-US" dirty="0"/>
               <a:t>/Simulink</a:t>
             </a:r>
           </a:p>
@@ -9001,27 +8998,19 @@
               <a:buAutoNum type="alphaUcPeriod"/>
             </a:pPr>
             <a:r>
-              <a:rPr lang="en-US" dirty="0" smtClean="0"/>
+              <a:rPr lang="en-US" dirty="0"/>
               <a:t>Determine the position of the craft in the tangential frame at time t = 250s given the initial conditions N0 = 1000m; E0 = -35m; </a:t>
             </a:r>
             <a:r>
-              <a:rPr lang="el-GR" dirty="0" smtClean="0"/>
+              <a:rPr lang="el-GR" dirty="0"/>
               <a:t>φ</a:t>
             </a:r>
             <a:r>
-              <a:rPr lang="da-DK" dirty="0" smtClean="0"/>
-              <a:t>0 </a:t>
-            </a:r>
-            <a:r>
               <a:rPr lang="da-DK" dirty="0"/>
-              <a:t>= -</a:t>
-            </a:r>
-            <a:r>
-              <a:rPr lang="da-DK" dirty="0" smtClean="0"/>
-              <a:t>25</a:t>
-            </a:r>
-            <a:r>
-              <a:rPr lang="en-US" dirty="0" smtClean="0"/>
+              <a:t>0 = -25</a:t>
+            </a:r>
+            <a:r>
+              <a:rPr lang="en-US" dirty="0"/>
               <a:t>deg.</a:t>
             </a:r>
           </a:p>
@@ -9031,7 +9020,7 @@
               <a:buAutoNum type="alphaUcPeriod"/>
             </a:pPr>
             <a:r>
-              <a:rPr lang="en-US" dirty="0" smtClean="0"/>
+              <a:rPr lang="en-US" dirty="0"/>
               <a:t>Plot the trajectory of the marine craft in the tangential frame</a:t>
             </a:r>
           </a:p>
@@ -9139,10 +9128,9 @@
           <a:lstStyle/>
           <a:p>
             <a:r>
-              <a:rPr lang="en-GB" dirty="0" smtClean="0"/>
+              <a:rPr lang="en-GB" dirty="0"/>
               <a:t>Exercise 1 – Vehicle kinematics</a:t>
             </a:r>
-            <a:endParaRPr lang="en-GB" dirty="0"/>
           </a:p>
         </p:txBody>
       </p:sp>
@@ -9172,43 +9160,43 @@
               <a:buAutoNum type="arabicPeriod" startAt="2"/>
             </a:pPr>
             <a:r>
-              <a:rPr lang="en-US" dirty="0" smtClean="0"/>
+              <a:rPr lang="en-US" dirty="0"/>
               <a:t>Assume that a constant current is now present in the geographical area where the marine craft is operating</a:t>
             </a:r>
             <a:r>
-              <a:rPr lang="da-DK" dirty="0" smtClean="0"/>
+              <a:rPr lang="da-DK" dirty="0"/>
               <a:t>. </a:t>
             </a:r>
             <a:r>
-              <a:rPr lang="en-US" dirty="0" smtClean="0"/>
+              <a:rPr lang="en-US" dirty="0"/>
               <a:t>The current velocity is </a:t>
             </a:r>
             <a:r>
-              <a:rPr lang="en-US" dirty="0" err="1" smtClean="0"/>
+              <a:rPr lang="en-US" dirty="0" err="1"/>
               <a:t>V</a:t>
             </a:r>
             <a:r>
-              <a:rPr lang="en-US" baseline="-25000" dirty="0" err="1" smtClean="0"/>
+              <a:rPr lang="en-US" baseline="-25000" dirty="0" err="1"/>
               <a:t>c</a:t>
             </a:r>
             <a:r>
-              <a:rPr lang="en-US" dirty="0" smtClean="0"/>
+              <a:rPr lang="en-US" dirty="0"/>
               <a:t> = 1.5 m/s and its direction is </a:t>
             </a:r>
             <a:r>
-              <a:rPr lang="el-GR" dirty="0" smtClean="0"/>
+              <a:rPr lang="el-GR" dirty="0"/>
               <a:t>β</a:t>
             </a:r>
             <a:r>
-              <a:rPr lang="da-DK" baseline="-25000" dirty="0" smtClean="0"/>
+              <a:rPr lang="da-DK" baseline="-25000" dirty="0"/>
               <a:t>c</a:t>
             </a:r>
             <a:r>
-              <a:rPr lang="da-DK" dirty="0" smtClean="0"/>
+              <a:rPr lang="da-DK" dirty="0"/>
               <a:t> = 65 </a:t>
             </a:r>
             <a:r>
-              <a:rPr lang="en-US" dirty="0" smtClean="0"/>
+              <a:rPr lang="en-US" dirty="0"/>
               <a:t>degrees. Compute the following:</a:t>
             </a:r>
           </a:p>
@@ -9218,7 +9206,7 @@
               <a:buAutoNum type="alphaUcPeriod"/>
             </a:pPr>
             <a:r>
-              <a:rPr lang="en-US" dirty="0" smtClean="0"/>
+              <a:rPr lang="en-US" dirty="0"/>
               <a:t>Modify the continuous time kinematic model to include the action of the ocean current</a:t>
             </a:r>
           </a:p>
@@ -9228,18 +9216,17 @@
               <a:buAutoNum type="alphaUcPeriod"/>
             </a:pPr>
             <a:r>
-              <a:rPr lang="en-US" dirty="0" smtClean="0"/>
+              <a:rPr lang="en-US" dirty="0"/>
               <a:t>Adapt the </a:t>
             </a:r>
             <a:r>
-              <a:rPr lang="en-US" dirty="0" err="1" smtClean="0"/>
+              <a:rPr lang="en-US" dirty="0" err="1"/>
               <a:t>Matlab</a:t>
             </a:r>
             <a:r>
-              <a:rPr lang="en-US" dirty="0" smtClean="0"/>
+              <a:rPr lang="en-US" dirty="0"/>
               <a:t>/Simulink model to include the action of an ocean current</a:t>
             </a:r>
-            <a:endParaRPr lang="en-US" dirty="0" smtClean="0"/>
           </a:p>
           <a:p>
             <a:pPr marL="558900" lvl="1" indent="-342900">
@@ -9247,7 +9234,7 @@
               <a:buAutoNum type="alphaUcPeriod"/>
             </a:pPr>
             <a:r>
-              <a:rPr lang="en-US" dirty="0" smtClean="0"/>
+              <a:rPr lang="en-US" dirty="0"/>
               <a:t>Repeat 1.C</a:t>
             </a:r>
           </a:p>
@@ -9257,10 +9244,9 @@
               <a:buAutoNum type="alphaUcPeriod"/>
             </a:pPr>
             <a:r>
-              <a:rPr lang="en-US" dirty="0" smtClean="0"/>
+              <a:rPr lang="en-US" dirty="0"/>
               <a:t>Repeat 1.D</a:t>
             </a:r>
-            <a:endParaRPr lang="en-US" dirty="0"/>
           </a:p>
         </p:txBody>
       </p:sp>
@@ -9363,10 +9349,9 @@
           <a:lstStyle/>
           <a:p>
             <a:r>
-              <a:rPr lang="en-GB" dirty="0" smtClean="0"/>
+              <a:rPr lang="en-GB" dirty="0"/>
               <a:t>Exercise 1 – Vehicle kinematics</a:t>
             </a:r>
-            <a:endParaRPr lang="en-GB" dirty="0"/>
           </a:p>
         </p:txBody>
       </p:sp>
@@ -9396,39 +9381,39 @@
               <a:buAutoNum type="arabicPeriod" startAt="3"/>
             </a:pPr>
             <a:r>
-              <a:rPr lang="en-US" dirty="0" smtClean="0"/>
+              <a:rPr lang="en-US" dirty="0"/>
               <a:t>A remotely operated vehicle is descending the water column by following a helix of radius a = 5m and a pitch</a:t>
             </a:r>
             <a:r>
-              <a:rPr lang="da-DK" dirty="0" smtClean="0"/>
+              <a:rPr lang="da-DK" dirty="0"/>
               <a:t> 2</a:t>
             </a:r>
             <a:r>
-              <a:rPr lang="el-GR" dirty="0" smtClean="0"/>
+              <a:rPr lang="el-GR" dirty="0"/>
               <a:t>π</a:t>
             </a:r>
             <a:r>
-              <a:rPr lang="da-DK" dirty="0" smtClean="0"/>
+              <a:rPr lang="da-DK" dirty="0"/>
               <a:t>b, </a:t>
             </a:r>
             <a:r>
-              <a:rPr lang="da-DK" dirty="0" err="1" smtClean="0"/>
+              <a:rPr lang="da-DK" dirty="0" err="1"/>
               <a:t>where</a:t>
             </a:r>
             <a:r>
-              <a:rPr lang="da-DK" dirty="0" smtClean="0"/>
+              <a:rPr lang="da-DK" dirty="0"/>
               <a:t> b = 0.25m/s (Info </a:t>
             </a:r>
             <a:r>
-              <a:rPr lang="da-DK" dirty="0" err="1" smtClean="0"/>
+              <a:rPr lang="da-DK" dirty="0" err="1"/>
               <a:t>about</a:t>
             </a:r>
             <a:r>
-              <a:rPr lang="da-DK" dirty="0" smtClean="0"/>
+              <a:rPr lang="da-DK" dirty="0"/>
               <a:t> </a:t>
             </a:r>
             <a:r>
-              <a:rPr lang="da-DK" dirty="0" err="1" smtClean="0"/>
+              <a:rPr lang="da-DK" dirty="0" err="1"/>
               <a:t>helix</a:t>
             </a:r>
             <a:r>
@@ -9439,16 +9424,10 @@
               <a:rPr lang="da-DK" dirty="0">
                 <a:hlinkClick r:id="rId4"/>
               </a:rPr>
-              <a:t>https://</a:t>
-            </a:r>
-            <a:r>
-              <a:rPr lang="da-DK" dirty="0" smtClean="0">
-                <a:hlinkClick r:id="rId4"/>
-              </a:rPr>
-              <a:t>en.wikipedia.org/wiki/Helix</a:t>
-            </a:r>
-            <a:r>
-              <a:rPr lang="en-US" dirty="0" smtClean="0"/>
+              <a:t>https://en.wikipedia.org/wiki/Helix</a:t>
+            </a:r>
+            <a:r>
+              <a:rPr lang="en-US" dirty="0"/>
               <a:t>).  Assuming that the descend time is 240 seconds, compute the following</a:t>
             </a:r>
           </a:p>
@@ -9458,7 +9437,7 @@
               <a:buAutoNum type="alphaUcPeriod"/>
             </a:pPr>
             <a:r>
-              <a:rPr lang="en-US" dirty="0" smtClean="0"/>
+              <a:rPr lang="en-US" dirty="0"/>
               <a:t>Derive the continuous time kinematic model describing the motion of the marine craft in the tangential frame</a:t>
             </a:r>
           </a:p>
@@ -9468,15 +9447,15 @@
               <a:buAutoNum type="alphaUcPeriod"/>
             </a:pPr>
             <a:r>
-              <a:rPr lang="en-US" dirty="0" smtClean="0"/>
+              <a:rPr lang="en-US" dirty="0"/>
               <a:t>Implement the obtained model in </a:t>
             </a:r>
             <a:r>
-              <a:rPr lang="en-US" dirty="0" err="1" smtClean="0"/>
+              <a:rPr lang="en-US" dirty="0" err="1"/>
               <a:t>Matlab</a:t>
             </a:r>
             <a:r>
-              <a:rPr lang="en-US" dirty="0" smtClean="0"/>
+              <a:rPr lang="en-US" dirty="0"/>
               <a:t>/Simulink</a:t>
             </a:r>
           </a:p>
@@ -9486,11 +9465,11 @@
               <a:buAutoNum type="alphaUcPeriod"/>
             </a:pPr>
             <a:r>
-              <a:rPr lang="en-US" dirty="0" smtClean="0"/>
+              <a:rPr lang="en-US" dirty="0"/>
               <a:t>Determine the position of the ROV at time t = 120s and at end of the descend, given the initial conditions N0 = 0m; E0 = 100m; D0 = 10m</a:t>
             </a:r>
             <a:r>
-              <a:rPr lang="da-DK" dirty="0" smtClean="0"/>
+              <a:rPr lang="da-DK" dirty="0"/>
               <a:t>; </a:t>
             </a:r>
             <a:r>
@@ -9499,14 +9478,10 @@
             </a:r>
             <a:r>
               <a:rPr lang="da-DK" dirty="0"/>
-              <a:t>0 = </a:t>
-            </a:r>
-            <a:r>
-              <a:rPr lang="da-DK" dirty="0" smtClean="0"/>
-              <a:t>90</a:t>
-            </a:r>
-            <a:r>
-              <a:rPr lang="en-US" dirty="0" smtClean="0"/>
+              <a:t>0 = 90</a:t>
+            </a:r>
+            <a:r>
+              <a:rPr lang="en-US" dirty="0"/>
               <a:t>deg.</a:t>
             </a:r>
           </a:p>
@@ -9516,7 +9491,7 @@
               <a:buAutoNum type="alphaUcPeriod"/>
             </a:pPr>
             <a:r>
-              <a:rPr lang="en-US" dirty="0" smtClean="0"/>
+              <a:rPr lang="en-US" dirty="0"/>
               <a:t>Plot the trajectory of the ROV in the tangential frame</a:t>
             </a:r>
           </a:p>
@@ -9590,7 +9565,7 @@
 </file>
 
 <file path=ppt/slides/slide5.xml><?xml version="1.0" encoding="utf-8"?>
-<p:sld xmlns:a="http://schemas.openxmlformats.org/drawingml/2006/main" xmlns:r="http://schemas.openxmlformats.org/officeDocument/2006/relationships" xmlns:p="http://schemas.openxmlformats.org/presentationml/2006/main" show="0">
+<p:sld xmlns:a="http://schemas.openxmlformats.org/drawingml/2006/main" xmlns:r="http://schemas.openxmlformats.org/officeDocument/2006/relationships" xmlns:p="http://schemas.openxmlformats.org/presentationml/2006/main">
   <p:cSld>
     <p:spTree>
       <p:nvGrpSpPr>
@@ -9628,10 +9603,9 @@
           <a:lstStyle/>
           <a:p>
             <a:r>
-              <a:rPr lang="en-GB" dirty="0" smtClean="0"/>
+              <a:rPr lang="en-GB" dirty="0"/>
               <a:t>Exercise 2 – Vehicle kinetics</a:t>
             </a:r>
-            <a:endParaRPr lang="en-GB" dirty="0"/>
           </a:p>
         </p:txBody>
       </p:sp>
@@ -9656,6 +9630,232 @@
           <a:bodyPr/>
           <a:lstStyle/>
           <a:p>
+            <a:r>
+              <a:rPr lang="en-GB" dirty="0"/>
+              <a:t>Using the </a:t>
+            </a:r>
+            <a:r>
+              <a:rPr lang="en-GB" dirty="0" err="1"/>
+              <a:t>BlueROV</a:t>
+            </a:r>
+            <a:r>
+              <a:rPr lang="en-GB" dirty="0"/>
+              <a:t> simulator, run and record the data to learn the surge dynamics. Run the simulators:</a:t>
+            </a:r>
+          </a:p>
+          <a:p>
+            <a:pPr lvl="1"/>
+            <a:r>
+              <a:rPr lang="en-GB" dirty="0" err="1"/>
+              <a:t>roslaunch</a:t>
+            </a:r>
+            <a:r>
+              <a:rPr lang="en-GB" dirty="0"/>
+              <a:t> bluerov2_gazebo </a:t>
+            </a:r>
+            <a:r>
+              <a:rPr lang="en-GB" dirty="0" err="1"/>
+              <a:t>start_pid_demo.launch</a:t>
+            </a:r>
+            <a:endParaRPr lang="en-GB" dirty="0"/>
+          </a:p>
+          <a:p>
+            <a:pPr lvl="1"/>
+            <a:r>
+              <a:rPr lang="en-GB" dirty="0" err="1"/>
+              <a:t>rosrun</a:t>
+            </a:r>
+            <a:r>
+              <a:rPr lang="en-GB" dirty="0"/>
+              <a:t> </a:t>
+            </a:r>
+            <a:r>
+              <a:rPr lang="en-US" dirty="0" err="1"/>
+              <a:t>bluerov_simple_command</a:t>
+            </a:r>
+            <a:r>
+              <a:rPr lang="en-US" dirty="0"/>
+              <a:t> square_wave_surge_command.py</a:t>
+            </a:r>
+          </a:p>
+          <a:p>
+            <a:r>
+              <a:rPr lang="en-US" dirty="0"/>
+              <a:t>Collect the data as .bag file:</a:t>
+            </a:r>
+            <a:endParaRPr lang="en-GB" dirty="0"/>
+          </a:p>
+          <a:p>
+            <a:pPr lvl="1"/>
+            <a:r>
+              <a:rPr lang="en-GB" dirty="0" err="1">
+                <a:solidFill>
+                  <a:srgbClr val="C00000"/>
+                </a:solidFill>
+              </a:rPr>
+              <a:t>rosbag</a:t>
+            </a:r>
+            <a:r>
+              <a:rPr lang="en-GB" dirty="0">
+                <a:solidFill>
+                  <a:srgbClr val="C00000"/>
+                </a:solidFill>
+              </a:rPr>
+              <a:t> record –a</a:t>
+            </a:r>
+          </a:p>
+          <a:p>
+            <a:pPr lvl="1"/>
+            <a:r>
+              <a:rPr lang="en-GB" dirty="0"/>
+              <a:t>After terminating (</a:t>
+            </a:r>
+            <a:r>
+              <a:rPr lang="en-GB" dirty="0" err="1"/>
+              <a:t>Ctrl+C</a:t>
+            </a:r>
+            <a:r>
+              <a:rPr lang="en-GB" dirty="0"/>
+              <a:t>), you can find the .bag file at “/home/ubuntu”</a:t>
+            </a:r>
+          </a:p>
+          <a:p>
+            <a:pPr lvl="1"/>
+            <a:r>
+              <a:rPr lang="en-GB" dirty="0"/>
+              <a:t>Note: you can record only the required topics by:</a:t>
+            </a:r>
+          </a:p>
+          <a:p>
+            <a:pPr lvl="2"/>
+            <a:r>
+              <a:rPr lang="en-US" dirty="0" err="1">
+                <a:solidFill>
+                  <a:srgbClr val="C00000"/>
+                </a:solidFill>
+              </a:rPr>
+              <a:t>rosbag</a:t>
+            </a:r>
+            <a:r>
+              <a:rPr lang="en-US" dirty="0">
+                <a:solidFill>
+                  <a:srgbClr val="C00000"/>
+                </a:solidFill>
+              </a:rPr>
+              <a:t> record &lt;topic1&gt; &lt;topic2&gt; ... &lt;</a:t>
+            </a:r>
+            <a:r>
+              <a:rPr lang="en-US" dirty="0" err="1">
+                <a:solidFill>
+                  <a:srgbClr val="C00000"/>
+                </a:solidFill>
+              </a:rPr>
+              <a:t>topicN</a:t>
+            </a:r>
+            <a:r>
+              <a:rPr lang="en-US" dirty="0">
+                <a:solidFill>
+                  <a:srgbClr val="C00000"/>
+                </a:solidFill>
+              </a:rPr>
+              <a:t>&gt;</a:t>
+            </a:r>
+          </a:p>
+          <a:p>
+            <a:pPr lvl="1"/>
+            <a:r>
+              <a:rPr lang="en-GB" dirty="0"/>
+              <a:t>Further reading about </a:t>
+            </a:r>
+            <a:r>
+              <a:rPr lang="en-GB" dirty="0" err="1"/>
+              <a:t>rosbag</a:t>
+            </a:r>
+            <a:r>
+              <a:rPr lang="en-GB" dirty="0"/>
+              <a:t>: </a:t>
+            </a:r>
+            <a:r>
+              <a:rPr lang="en-GB" dirty="0">
+                <a:hlinkClick r:id="rId4"/>
+              </a:rPr>
+              <a:t>wiki.ros.org/</a:t>
+            </a:r>
+            <a:r>
+              <a:rPr lang="en-GB" dirty="0" err="1">
+                <a:hlinkClick r:id="rId4"/>
+              </a:rPr>
+              <a:t>rosbag</a:t>
+            </a:r>
+            <a:r>
+              <a:rPr lang="en-GB" dirty="0">
+                <a:hlinkClick r:id="rId4"/>
+              </a:rPr>
+              <a:t>/</a:t>
+            </a:r>
+            <a:r>
+              <a:rPr lang="en-GB" dirty="0" err="1">
+                <a:hlinkClick r:id="rId4"/>
+              </a:rPr>
+              <a:t>Commandline</a:t>
+            </a:r>
+            <a:endParaRPr lang="en-GB" dirty="0"/>
+          </a:p>
+          <a:p>
+            <a:r>
+              <a:rPr lang="en-US" dirty="0"/>
+              <a:t>After recording the data, you can either convert the bag file to </a:t>
+            </a:r>
+            <a:r>
+              <a:rPr lang="en-US" b="1" dirty="0">
+                <a:solidFill>
+                  <a:srgbClr val="C00000"/>
+                </a:solidFill>
+              </a:rPr>
+              <a:t>csv</a:t>
+            </a:r>
+            <a:r>
+              <a:rPr lang="en-US" dirty="0"/>
+              <a:t> or </a:t>
+            </a:r>
+            <a:r>
+              <a:rPr lang="en-US" b="1" dirty="0">
+                <a:solidFill>
+                  <a:srgbClr val="C00000"/>
+                </a:solidFill>
+              </a:rPr>
+              <a:t>mat</a:t>
+            </a:r>
+            <a:r>
+              <a:rPr lang="en-US" dirty="0"/>
+              <a:t> format.</a:t>
+            </a:r>
+          </a:p>
+          <a:p>
+            <a:r>
+              <a:rPr lang="en-GB" dirty="0"/>
+              <a:t>The python code as the reference for how to convert the bag file to </a:t>
+            </a:r>
+            <a:r>
+              <a:rPr lang="en-GB" b="1" dirty="0">
+                <a:solidFill>
+                  <a:srgbClr val="C00000"/>
+                </a:solidFill>
+              </a:rPr>
+              <a:t>mat</a:t>
+            </a:r>
+            <a:r>
+              <a:rPr lang="en-GB" dirty="0"/>
+              <a:t> file is available on Gitlab.</a:t>
+            </a:r>
+          </a:p>
+          <a:p>
+            <a:pPr marL="0" indent="0">
+              <a:buNone/>
+            </a:pPr>
+            <a:endParaRPr lang="en-GB" dirty="0"/>
+          </a:p>
+          <a:p>
             <a:endParaRPr lang="en-GB" dirty="0"/>
           </a:p>
         </p:txBody>
@@ -9717,14 +9917,6 @@
   <p:clrMapOvr>
     <a:masterClrMapping/>
   </p:clrMapOvr>
-  <mc:AlternateContent xmlns:mc="http://schemas.openxmlformats.org/markup-compatibility/2006">
-    <mc:Choice xmlns:p14="http://schemas.microsoft.com/office/powerpoint/2010/main" Requires="p14">
-      <p:transition spd="slow" p14:dur="2000"/>
-    </mc:Choice>
-    <mc:Fallback>
-      <p:transition spd="slow"/>
-    </mc:Fallback>
-  </mc:AlternateContent>
 </p:sld>
 </file>
 
@@ -10660,7 +10852,7 @@
 </file>
 
 <file path=customXml/item1.xml><?xml version="1.0" encoding="utf-8"?>
-<TemplafyTemplateConfiguration><![CDATA[{"elementsMetadata":[{"type":"shape","id":"4677ba61-354d-4365-8b3f-c04251d5c3e5","elementConfiguration":{"binding":"UserProfile.Offices.Workarea_{{DocumentLanguage}}","disableUpdates":false,"type":"text"}},{"type":"shape","id":"b679746d-93d5-4d43-90a4-93ebe9ac3257","elementConfiguration":{"format":"{{DateFormats.GeneralDate}}","binding":"Form.Date","disableUpdates":false,"type":"date"}},{"type":"shape","id":"2b4439ed-ce1f-4eaa-844c-d1e3543b3122","elementConfiguration":{"binding":"Form.PresentationTitle","disableUpdates":false,"type":"text"}}],"transformationConfigurations":[{"language":"{{DocumentLanguage}}","disableUpdates":false,"type":"proofingLanguage"}],"templateName":"DTU Template 16_9 - Navy blue","templateDescription":"","enableDocumentContentUpdater":true,"version":"1.2"}]]></TemplafyTemplateConfiguration>
+<TemplafySlideTemplateConfiguration><![CDATA[{"documentContentValidatorConfiguration":{"enableDocumentContentValidator":false,"documentContentValidatorVersion":0},"elementsMetadata":[],"slideId":"636957681585124447","enableDocumentContentUpdater":true,"version":"1.2"}]]></TemplafySlideTemplateConfiguration>
 </file>
 
 <file path=customXml/item10.xml><?xml version="1.0" encoding="utf-8"?>
@@ -10672,7 +10864,7 @@
 </file>
 
 <file path=customXml/item12.xml><?xml version="1.0" encoding="utf-8"?>
-<TemplafySlideTemplateConfiguration><![CDATA[{"documentContentValidatorConfiguration":{"enableDocumentContentValidator":false,"documentContentValidatorVersion":0},"elementsMetadata":[],"slideId":"636957681585124447","enableDocumentContentUpdater":true,"version":"1.2"}]]></TemplafySlideTemplateConfiguration>
+<TemplafySlideFormConfiguration><![CDATA[{"formFields":[],"formDataEntries":[]}]]></TemplafySlideFormConfiguration>
 </file>
 
 <file path=customXml/item2.xml><?xml version="1.0" encoding="utf-8"?>
@@ -10680,27 +10872,27 @@
 </file>
 
 <file path=customXml/item3.xml><?xml version="1.0" encoding="utf-8"?>
+<TemplafyTemplateConfiguration><![CDATA[{"elementsMetadata":[{"type":"shape","id":"4677ba61-354d-4365-8b3f-c04251d5c3e5","elementConfiguration":{"binding":"UserProfile.Offices.Workarea_{{DocumentLanguage}}","disableUpdates":false,"type":"text"}},{"type":"shape","id":"b679746d-93d5-4d43-90a4-93ebe9ac3257","elementConfiguration":{"format":"{{DateFormats.GeneralDate}}","binding":"Form.Date","disableUpdates":false,"type":"date"}},{"type":"shape","id":"2b4439ed-ce1f-4eaa-844c-d1e3543b3122","elementConfiguration":{"binding":"Form.PresentationTitle","disableUpdates":false,"type":"text"}}],"transformationConfigurations":[{"language":"{{DocumentLanguage}}","disableUpdates":false,"type":"proofingLanguage"}],"templateName":"DTU Template 16_9 - Navy blue","templateDescription":"","enableDocumentContentUpdater":true,"version":"1.2"}]]></TemplafyTemplateConfiguration>
+</file>
+
+<file path=customXml/item4.xml><?xml version="1.0" encoding="utf-8"?>
+<TemplafySlideTemplateConfiguration><![CDATA[{"documentContentValidatorConfiguration":{"enableDocumentContentValidator":false,"documentContentValidatorVersion":0},"elementsMetadata":[],"slideId":"636957681585013765","enableDocumentContentUpdater":true,"version":"1.2"}]]></TemplafySlideTemplateConfiguration>
+</file>
+
+<file path=customXml/item5.xml><?xml version="1.0" encoding="utf-8"?>
 <TemplafySlideFormConfiguration><![CDATA[{"formFields":[],"formDataEntries":[]}]]></TemplafySlideFormConfiguration>
 </file>
 
-<file path=customXml/item4.xml><?xml version="1.0" encoding="utf-8"?>
-<TemplafySlideFormConfiguration><![CDATA[{"formFields":[],"formDataEntries":[]}]]></TemplafySlideFormConfiguration>
-</file>
-
-<file path=customXml/item5.xml><?xml version="1.0" encoding="utf-8"?>
+<file path=customXml/item6.xml><?xml version="1.0" encoding="utf-8"?>
 <TemplafySlideTemplateConfiguration><![CDATA[{"documentContentValidatorConfiguration":{"enableDocumentContentValidator":false,"documentContentValidatorVersion":0},"elementsMetadata":[],"slideId":"636957681585124447","enableDocumentContentUpdater":true,"version":"1.2"}]]></TemplafySlideTemplateConfiguration>
 </file>
 
-<file path=customXml/item6.xml><?xml version="1.0" encoding="utf-8"?>
-<TemplafySlideTemplateConfiguration><![CDATA[{"documentContentValidatorConfiguration":{"enableDocumentContentValidator":false,"documentContentValidatorVersion":0},"elementsMetadata":[],"slideId":"636957681585013765","enableDocumentContentUpdater":true,"version":"1.2"}]]></TemplafySlideTemplateConfiguration>
-</file>
-
 <file path=customXml/item7.xml><?xml version="1.0" encoding="utf-8"?>
-<TemplafySlideFormConfiguration><![CDATA[{"formFields":[],"formDataEntries":[]}]]></TemplafySlideFormConfiguration>
+<TemplafySlideTemplateConfiguration><![CDATA[{"documentContentValidatorConfiguration":{"enableDocumentContentValidator":false,"documentContentValidatorVersion":0},"elementsMetadata":[],"slideId":"636957681585124447","enableDocumentContentUpdater":true,"version":"1.2"}]]></TemplafySlideTemplateConfiguration>
 </file>
 
 <file path=customXml/item8.xml><?xml version="1.0" encoding="utf-8"?>
-<TemplafySlideTemplateConfiguration><![CDATA[{"documentContentValidatorConfiguration":{"enableDocumentContentValidator":false,"documentContentValidatorVersion":0},"elementsMetadata":[],"slideId":"636957681585124447","enableDocumentContentUpdater":true,"version":"1.2"}]]></TemplafySlideTemplateConfiguration>
+<TemplafySlideFormConfiguration><![CDATA[{"formFields":[],"formDataEntries":[]}]]></TemplafySlideFormConfiguration>
 </file>
 
 <file path=customXml/item9.xml><?xml version="1.0" encoding="utf-8"?>
@@ -10708,25 +10900,25 @@
 </file>
 
 <file path=customXml/itemProps1.xml><?xml version="1.0" encoding="utf-8"?>
-<ds:datastoreItem xmlns:ds="http://schemas.openxmlformats.org/officeDocument/2006/customXml" ds:itemID="{1334258C-C3E7-4029-A615-C886A240FB15}">
+<ds:datastoreItem xmlns:ds="http://schemas.openxmlformats.org/officeDocument/2006/customXml" ds:itemID="{702F02BD-EF73-4E63-8A58-D6D01DA6920B}">
   <ds:schemaRefs/>
 </ds:datastoreItem>
 </file>
 
 <file path=customXml/itemProps10.xml><?xml version="1.0" encoding="utf-8"?>
-<ds:datastoreItem xmlns:ds="http://schemas.openxmlformats.org/officeDocument/2006/customXml" ds:itemID="{D99B73BB-2503-4BD9-B94F-908C6BD1F709}">
+<ds:datastoreItem xmlns:ds="http://schemas.openxmlformats.org/officeDocument/2006/customXml" ds:itemID="{AD091A09-3CB8-44F3-AFDB-D8A682CADFEC}">
   <ds:schemaRefs/>
 </ds:datastoreItem>
 </file>
 
 <file path=customXml/itemProps11.xml><?xml version="1.0" encoding="utf-8"?>
-<ds:datastoreItem xmlns:ds="http://schemas.openxmlformats.org/officeDocument/2006/customXml" ds:itemID="{4D7CE9D4-5C15-407B-BD14-B5E1AF93BE28}">
+<ds:datastoreItem xmlns:ds="http://schemas.openxmlformats.org/officeDocument/2006/customXml" ds:itemID="{C6406FEB-B081-4DE3-B790-BA4B3B8258E1}">
   <ds:schemaRefs/>
 </ds:datastoreItem>
 </file>
 
 <file path=customXml/itemProps12.xml><?xml version="1.0" encoding="utf-8"?>
-<ds:datastoreItem xmlns:ds="http://schemas.openxmlformats.org/officeDocument/2006/customXml" ds:itemID="{702F02BD-EF73-4E63-8A58-D6D01DA6920B}">
+<ds:datastoreItem xmlns:ds="http://schemas.openxmlformats.org/officeDocument/2006/customXml" ds:itemID="{BCE4F6AA-590D-471F-8869-D7C9C388B21F}">
   <ds:schemaRefs/>
 </ds:datastoreItem>
 </file>
@@ -10738,37 +10930,37 @@
 </file>
 
 <file path=customXml/itemProps3.xml><?xml version="1.0" encoding="utf-8"?>
-<ds:datastoreItem xmlns:ds="http://schemas.openxmlformats.org/officeDocument/2006/customXml" ds:itemID="{C6406FEB-B081-4DE3-B790-BA4B3B8258E1}">
+<ds:datastoreItem xmlns:ds="http://schemas.openxmlformats.org/officeDocument/2006/customXml" ds:itemID="{1334258C-C3E7-4029-A615-C886A240FB15}">
   <ds:schemaRefs/>
 </ds:datastoreItem>
 </file>
 
 <file path=customXml/itemProps4.xml><?xml version="1.0" encoding="utf-8"?>
-<ds:datastoreItem xmlns:ds="http://schemas.openxmlformats.org/officeDocument/2006/customXml" ds:itemID="{7FEA1E6D-AEEC-41D9-9E9A-45BA2EAE1656}">
+<ds:datastoreItem xmlns:ds="http://schemas.openxmlformats.org/officeDocument/2006/customXml" ds:itemID="{4D5E1A10-B5E6-482A-9521-846112537EBC}">
   <ds:schemaRefs/>
 </ds:datastoreItem>
 </file>
 
 <file path=customXml/itemProps5.xml><?xml version="1.0" encoding="utf-8"?>
+<ds:datastoreItem xmlns:ds="http://schemas.openxmlformats.org/officeDocument/2006/customXml" ds:itemID="{4D7CE9D4-5C15-407B-BD14-B5E1AF93BE28}">
+  <ds:schemaRefs/>
+</ds:datastoreItem>
+</file>
+
+<file path=customXml/itemProps6.xml><?xml version="1.0" encoding="utf-8"?>
 <ds:datastoreItem xmlns:ds="http://schemas.openxmlformats.org/officeDocument/2006/customXml" ds:itemID="{68A48CB6-BD0D-4923-9904-A1B6E74851B2}">
   <ds:schemaRefs/>
 </ds:datastoreItem>
 </file>
 
-<file path=customXml/itemProps6.xml><?xml version="1.0" encoding="utf-8"?>
-<ds:datastoreItem xmlns:ds="http://schemas.openxmlformats.org/officeDocument/2006/customXml" ds:itemID="{4D5E1A10-B5E6-482A-9521-846112537EBC}">
-  <ds:schemaRefs/>
-</ds:datastoreItem>
-</file>
-
 <file path=customXml/itemProps7.xml><?xml version="1.0" encoding="utf-8"?>
-<ds:datastoreItem xmlns:ds="http://schemas.openxmlformats.org/officeDocument/2006/customXml" ds:itemID="{BCE4F6AA-590D-471F-8869-D7C9C388B21F}">
+<ds:datastoreItem xmlns:ds="http://schemas.openxmlformats.org/officeDocument/2006/customXml" ds:itemID="{D99B73BB-2503-4BD9-B94F-908C6BD1F709}">
   <ds:schemaRefs/>
 </ds:datastoreItem>
 </file>
 
 <file path=customXml/itemProps8.xml><?xml version="1.0" encoding="utf-8"?>
-<ds:datastoreItem xmlns:ds="http://schemas.openxmlformats.org/officeDocument/2006/customXml" ds:itemID="{AD091A09-3CB8-44F3-AFDB-D8A682CADFEC}">
+<ds:datastoreItem xmlns:ds="http://schemas.openxmlformats.org/officeDocument/2006/customXml" ds:itemID="{7FEA1E6D-AEEC-41D9-9E9A-45BA2EAE1656}">
   <ds:schemaRefs/>
 </ds:datastoreItem>
 </file>

</xml_diff>